<commit_message>
Synchronized modifier Concept added to the notes.
</commit_message>
<xml_diff>
--- a/CoreJava/10_MultiThreading/Thread Lifecycle.pptx
+++ b/CoreJava/10_MultiThreading/Thread Lifecycle.pptx
@@ -106,6 +106,11 @@
       </a:defRPr>
     </a:lvl9pPr>
   </p:defaultTextStyle>
+  <p:extLst>
+    <p:ext uri="{EFAFB233-063F-42B5-8137-9DF3F51BA10A}">
+      <p15:sldGuideLst xmlns:p15="http://schemas.microsoft.com/office/powerpoint/2012/main"/>
+    </p:ext>
+  </p:extLst>
 </p:presentation>
 </file>
 
@@ -4361,7 +4366,7 @@
         </p:spPr>
         <p:txBody>
           <a:bodyPr>
-            <a:normAutofit/>
+            <a:normAutofit lnSpcReduction="10000"/>
           </a:bodyPr>
           <a:lstStyle/>
           <a:p>
@@ -4391,88 +4396,140 @@
               <a:rPr lang="en-US" dirty="0"/>
             </a:br>
             <a:r>
-              <a:rPr lang="en-US" dirty="0" err="1"/>
+              <a:rPr lang="en-US" dirty="0" err="1">
+                <a:solidFill>
+                  <a:srgbClr val="CC00CC"/>
+                </a:solidFill>
+              </a:rPr>
               <a:t>Thread.join</a:t>
             </a:r>
             <a:r>
-              <a:rPr lang="en-US" dirty="0"/>
+              <a:rPr lang="en-US" dirty="0">
+                <a:solidFill>
+                  <a:srgbClr val="CC00CC"/>
+                </a:solidFill>
+              </a:rPr>
+              <a:t>()</a:t>
+            </a:r>
+            <a:br>
+              <a:rPr lang="en-US" dirty="0">
+                <a:solidFill>
+                  <a:srgbClr val="CC00CC"/>
+                </a:solidFill>
+              </a:rPr>
+            </a:br>
+            <a:r>
+              <a:rPr lang="en-US" dirty="0" err="1">
+                <a:solidFill>
+                  <a:srgbClr val="CC00CC"/>
+                </a:solidFill>
+              </a:rPr>
+              <a:t>Thead.sleep</a:t>
+            </a:r>
+            <a:r>
+              <a:rPr lang="en-US" dirty="0">
+                <a:solidFill>
+                  <a:srgbClr val="CC00CC"/>
+                </a:solidFill>
+              </a:rPr>
+              <a:t>()</a:t>
+            </a:r>
+            <a:br>
+              <a:rPr lang="en-US" dirty="0">
+                <a:solidFill>
+                  <a:srgbClr val="CC00CC"/>
+                </a:solidFill>
+              </a:rPr>
+            </a:br>
+            <a:r>
+              <a:rPr lang="en-US" dirty="0" err="1">
+                <a:solidFill>
+                  <a:srgbClr val="CC00CC"/>
+                </a:solidFill>
+              </a:rPr>
+              <a:t>Thread.wait</a:t>
+            </a:r>
+            <a:r>
+              <a:rPr lang="en-US" dirty="0">
+                <a:solidFill>
+                  <a:srgbClr val="CC00CC"/>
+                </a:solidFill>
+              </a:rPr>
               <a:t>()</a:t>
             </a:r>
             <a:br>
               <a:rPr lang="en-US" dirty="0"/>
             </a:br>
             <a:r>
+              <a:rPr lang="en-US" dirty="0" err="1">
+                <a:solidFill>
+                  <a:srgbClr val="00B0F0"/>
+                </a:solidFill>
+              </a:rPr>
+              <a:t>Thread.suspend</a:t>
+            </a:r>
+            <a:r>
+              <a:rPr lang="en-US" dirty="0">
+                <a:solidFill>
+                  <a:srgbClr val="00B0F0"/>
+                </a:solidFill>
+              </a:rPr>
+              <a:t>()  </a:t>
+            </a:r>
+            <a:r>
+              <a:rPr lang="en-US" dirty="0"/>
+              <a:t>, </a:t>
+            </a:r>
+          </a:p>
+          <a:p>
+            <a:endParaRPr lang="en-US" dirty="0"/>
+          </a:p>
+          <a:p>
+            <a:r>
+              <a:rPr lang="en-US" dirty="0"/>
+              <a:t>if we call </a:t>
+            </a:r>
+            <a:r>
               <a:rPr lang="en-US" dirty="0" err="1"/>
-              <a:t>Thead.sleep</a:t>
+              <a:t>Thread.suspend</a:t>
             </a:r>
             <a:r>
               <a:rPr lang="en-US" dirty="0"/>
-              <a:t>()</a:t>
+              <a:t>() then the Thread will be in Blocked state </a:t>
+            </a:r>
+            <a:r>
+              <a:rPr lang="en-US" dirty="0" err="1"/>
+              <a:t>only,until</a:t>
+            </a:r>
+            <a:r>
+              <a:rPr lang="en-US" dirty="0"/>
+              <a:t> we call </a:t>
+            </a:r>
+            <a:r>
+              <a:rPr lang="en-US" dirty="0" err="1"/>
+              <a:t>Thead.resume</a:t>
+            </a:r>
+            <a:r>
+              <a:rPr lang="en-US" dirty="0"/>
+              <a:t>().</a:t>
             </a:r>
             <a:br>
               <a:rPr lang="en-US" dirty="0"/>
             </a:br>
             <a:r>
               <a:rPr lang="en-US" dirty="0" err="1"/>
-              <a:t>Thread.wait</a:t>
-            </a:r>
-            <a:r>
-              <a:rPr lang="en-US" dirty="0"/>
-              <a:t>()</a:t>
-            </a:r>
-            <a:br>
-              <a:rPr lang="en-US" dirty="0"/>
-            </a:br>
-            <a:r>
-              <a:rPr lang="en-US" dirty="0" err="1"/>
-              <a:t>Thread.suspend</a:t>
-            </a:r>
-            <a:r>
-              <a:rPr lang="en-US" dirty="0"/>
-              <a:t>()  , </a:t>
-            </a:r>
-            <a:br>
-              <a:rPr lang="en-US" dirty="0"/>
-            </a:br>
-            <a:br>
-              <a:rPr lang="en-US" dirty="0"/>
-            </a:br>
-            <a:r>
-              <a:rPr lang="en-US" dirty="0"/>
-              <a:t>if we call </a:t>
-            </a:r>
-            <a:r>
-              <a:rPr lang="en-US" dirty="0" err="1"/>
-              <a:t>Thread.suspend</a:t>
-            </a:r>
-            <a:r>
-              <a:rPr lang="en-US" dirty="0"/>
-              <a:t>() then the Thread will be in Blocked state </a:t>
-            </a:r>
-            <a:r>
-              <a:rPr lang="en-US" dirty="0" err="1"/>
-              <a:t>only,until</a:t>
-            </a:r>
-            <a:r>
-              <a:rPr lang="en-US" dirty="0"/>
-              <a:t> we call </a:t>
-            </a:r>
-            <a:r>
-              <a:rPr lang="en-US" dirty="0" err="1"/>
-              <a:t>Thead.resume</a:t>
-            </a:r>
-            <a:r>
-              <a:rPr lang="en-US" dirty="0"/>
-              <a:t>(). </a:t>
-            </a:r>
-            <a:r>
-              <a:rPr lang="en-US" dirty="0" err="1"/>
               <a:t>Thread.resume</a:t>
             </a:r>
             <a:r>
               <a:rPr lang="en-US" dirty="0"/>
               <a:t>() should be applied only with suspend () method call</a:t>
             </a:r>
+          </a:p>
+          <a:p>
+            <a:pPr marL="0" indent="0">
+              <a:buNone/>
+            </a:pPr>
+            <a:endParaRPr lang="en-US" dirty="0"/>
           </a:p>
           <a:p>
             <a:r>

</xml_diff>